<commit_message>
"make system 최종 결과물"
</commit_message>
<xml_diff>
--- a/make 시스템 발표 2020875024 배수훈.pptx
+++ b/make 시스템 발표 2020875024 배수훈.pptx
@@ -16,6 +16,7 @@
     <p:sldId id="264" r:id="rId10"/>
     <p:sldId id="265" r:id="rId11"/>
     <p:sldId id="266" r:id="rId12"/>
+    <p:sldId id="267" r:id="rId13"/>
   </p:sldIdLst>
   <p:sldSz cx="18288000" cy="10287000"/>
   <p:notesSz cx="10287000" cy="18288000"/>
@@ -3698,6 +3699,339 @@
           <a:chExt cx="0" cy="0"/>
         </a:xfrm>
       </p:grpSpPr>
+      <p:grpSp>
+        <p:nvGrpSpPr>
+          <p:cNvPr id="1001" name="그룹 1001"/>
+          <p:cNvGrpSpPr/>
+          <p:nvPr/>
+        </p:nvGrpSpPr>
+        <p:grpSpPr>
+          <a:xfrm>
+            <a:off x="867846" y="9325428"/>
+            <a:ext cx="16284590" cy="1025987"/>
+            <a:chOff x="867846" y="9325428"/>
+            <a:chExt cx="16284590" cy="1025987"/>
+          </a:xfrm>
+        </p:grpSpPr>
+        <p:pic>
+          <p:nvPicPr>
+            <p:cNvPr id="3" name="Object 2"/>
+            <p:cNvPicPr>
+              <a:picLocks noChangeAspect="1"/>
+            </p:cNvPicPr>
+            <p:nvPr/>
+          </p:nvPicPr>
+          <p:blipFill>
+            <a:blip r:embed="rId2" cstate="print"/>
+            <a:stretch>
+              <a:fillRect/>
+            </a:stretch>
+          </p:blipFill>
+          <p:spPr>
+            <a:xfrm>
+              <a:off x="867846" y="9325428"/>
+              <a:ext cx="16284590" cy="1025987"/>
+            </a:xfrm>
+            <a:prstGeom prst="rect">
+              <a:avLst/>
+            </a:prstGeom>
+          </p:spPr>
+        </p:pic>
+      </p:grpSp>
+      <p:pic>
+        <p:nvPicPr>
+          <p:cNvPr id="5" name="Object 4"/>
+          <p:cNvPicPr>
+            <a:picLocks noChangeAspect="1"/>
+          </p:cNvPicPr>
+          <p:nvPr/>
+        </p:nvPicPr>
+        <p:blipFill>
+          <a:blip r:embed="rId3" cstate="print"/>
+          <a:stretch>
+            <a:fillRect/>
+          </a:stretch>
+        </p:blipFill>
+        <p:spPr>
+          <a:xfrm>
+            <a:off x="17464191" y="9540858"/>
+            <a:ext cx="388673" cy="324435"/>
+          </a:xfrm>
+          <a:prstGeom prst="rect">
+            <a:avLst/>
+          </a:prstGeom>
+        </p:spPr>
+      </p:pic>
+      <p:grpSp>
+        <p:nvGrpSpPr>
+          <p:cNvPr id="1002" name="그룹 1002"/>
+          <p:cNvGrpSpPr/>
+          <p:nvPr/>
+        </p:nvGrpSpPr>
+        <p:grpSpPr>
+          <a:xfrm>
+            <a:off x="17425628" y="9818012"/>
+            <a:ext cx="357143" cy="28571"/>
+            <a:chOff x="17425628" y="9818012"/>
+            <a:chExt cx="357143" cy="28571"/>
+          </a:xfrm>
+        </p:grpSpPr>
+        <p:pic>
+          <p:nvPicPr>
+            <p:cNvPr id="7" name="Object 6"/>
+            <p:cNvPicPr>
+              <a:picLocks noChangeAspect="1"/>
+            </p:cNvPicPr>
+            <p:nvPr/>
+          </p:nvPicPr>
+          <p:blipFill>
+            <a:blip r:embed="rId4" cstate="print"/>
+            <a:stretch>
+              <a:fillRect/>
+            </a:stretch>
+          </p:blipFill>
+          <p:spPr>
+            <a:xfrm>
+              <a:off x="17425628" y="9818012"/>
+              <a:ext cx="357143" cy="28571"/>
+            </a:xfrm>
+            <a:prstGeom prst="rect">
+              <a:avLst/>
+            </a:prstGeom>
+          </p:spPr>
+        </p:pic>
+      </p:grpSp>
+      <p:pic>
+        <p:nvPicPr>
+          <p:cNvPr id="9" name="Object 8"/>
+          <p:cNvPicPr>
+            <a:picLocks noChangeAspect="1"/>
+          </p:cNvPicPr>
+          <p:nvPr/>
+        </p:nvPicPr>
+        <p:blipFill>
+          <a:blip r:embed="rId5" cstate="print"/>
+          <a:stretch>
+            <a:fillRect/>
+          </a:stretch>
+        </p:blipFill>
+        <p:spPr>
+          <a:xfrm>
+            <a:off x="1244715" y="594115"/>
+            <a:ext cx="1361339" cy="441263"/>
+          </a:xfrm>
+          <a:prstGeom prst="rect">
+            <a:avLst/>
+          </a:prstGeom>
+        </p:spPr>
+      </p:pic>
+      <p:pic>
+        <p:nvPicPr>
+          <p:cNvPr id="10" name="Object 9"/>
+          <p:cNvPicPr>
+            <a:picLocks noChangeAspect="1"/>
+          </p:cNvPicPr>
+          <p:nvPr/>
+        </p:nvPicPr>
+        <p:blipFill>
+          <a:blip r:embed="rId6" cstate="print"/>
+          <a:stretch>
+            <a:fillRect/>
+          </a:stretch>
+        </p:blipFill>
+        <p:spPr>
+          <a:xfrm>
+            <a:off x="504581" y="482860"/>
+            <a:ext cx="721842" cy="628090"/>
+          </a:xfrm>
+          <a:prstGeom prst="rect">
+            <a:avLst/>
+          </a:prstGeom>
+        </p:spPr>
+      </p:pic>
+      <p:grpSp>
+        <p:nvGrpSpPr>
+          <p:cNvPr id="1003" name="그룹 1003"/>
+          <p:cNvGrpSpPr/>
+          <p:nvPr/>
+        </p:nvGrpSpPr>
+        <p:grpSpPr>
+          <a:xfrm>
+            <a:off x="913834" y="2214039"/>
+            <a:ext cx="8418988" cy="6776894"/>
+            <a:chOff x="913834" y="2214039"/>
+            <a:chExt cx="8418988" cy="6776894"/>
+          </a:xfrm>
+        </p:grpSpPr>
+        <p:pic>
+          <p:nvPicPr>
+            <p:cNvPr id="12" name="Object 11"/>
+            <p:cNvPicPr>
+              <a:picLocks noChangeAspect="1"/>
+            </p:cNvPicPr>
+            <p:nvPr/>
+          </p:nvPicPr>
+          <p:blipFill>
+            <a:blip r:embed="rId7" cstate="print"/>
+            <a:stretch>
+              <a:fillRect/>
+            </a:stretch>
+          </p:blipFill>
+          <p:spPr>
+            <a:xfrm>
+              <a:off x="-2853323" y="-732071"/>
+              <a:ext cx="16837976" cy="13553788"/>
+            </a:xfrm>
+            <a:prstGeom prst="rect">
+              <a:avLst/>
+            </a:prstGeom>
+          </p:spPr>
+        </p:pic>
+        <p:pic>
+          <p:nvPicPr>
+            <p:cNvPr id="13" name="Object 12"/>
+            <p:cNvPicPr>
+              <a:picLocks noChangeAspect="1"/>
+            </p:cNvPicPr>
+            <p:nvPr/>
+          </p:nvPicPr>
+          <p:blipFill>
+            <a:blip r:embed="rId8" cstate="print"/>
+            <a:stretch>
+              <a:fillRect/>
+            </a:stretch>
+          </p:blipFill>
+          <p:spPr>
+            <a:xfrm>
+              <a:off x="913834" y="2214039"/>
+              <a:ext cx="8418988" cy="6776894"/>
+            </a:xfrm>
+            <a:prstGeom prst="rect">
+              <a:avLst/>
+            </a:prstGeom>
+          </p:spPr>
+        </p:pic>
+      </p:grpSp>
+      <p:grpSp>
+        <p:nvGrpSpPr>
+          <p:cNvPr id="1004" name="그룹 1004"/>
+          <p:cNvGrpSpPr/>
+          <p:nvPr/>
+        </p:nvGrpSpPr>
+        <p:grpSpPr>
+          <a:xfrm>
+            <a:off x="7889079" y="808396"/>
+            <a:ext cx="10104310" cy="3729934"/>
+            <a:chOff x="7889079" y="808396"/>
+            <a:chExt cx="10104310" cy="3729934"/>
+          </a:xfrm>
+        </p:grpSpPr>
+        <p:pic>
+          <p:nvPicPr>
+            <p:cNvPr id="16" name="Object 15"/>
+            <p:cNvPicPr>
+              <a:picLocks noChangeAspect="1"/>
+            </p:cNvPicPr>
+            <p:nvPr/>
+          </p:nvPicPr>
+          <p:blipFill>
+            <a:blip r:embed="rId9" cstate="print"/>
+            <a:stretch>
+              <a:fillRect/>
+            </a:stretch>
+          </p:blipFill>
+          <p:spPr>
+            <a:xfrm>
+              <a:off x="3080382" y="-813113"/>
+              <a:ext cx="20208620" cy="7459868"/>
+            </a:xfrm>
+            <a:prstGeom prst="rect">
+              <a:avLst/>
+            </a:prstGeom>
+          </p:spPr>
+        </p:pic>
+        <p:pic>
+          <p:nvPicPr>
+            <p:cNvPr id="17" name="Object 16"/>
+            <p:cNvPicPr>
+              <a:picLocks noChangeAspect="1"/>
+            </p:cNvPicPr>
+            <p:nvPr/>
+          </p:nvPicPr>
+          <p:blipFill>
+            <a:blip r:embed="rId10" cstate="print"/>
+            <a:stretch>
+              <a:fillRect/>
+            </a:stretch>
+          </p:blipFill>
+          <p:spPr>
+            <a:xfrm>
+              <a:off x="7889079" y="808396"/>
+              <a:ext cx="10104310" cy="3729934"/>
+            </a:xfrm>
+            <a:prstGeom prst="rect">
+              <a:avLst/>
+            </a:prstGeom>
+          </p:spPr>
+        </p:pic>
+      </p:grpSp>
+      <p:pic>
+        <p:nvPicPr>
+          <p:cNvPr id="19" name="Object 18"/>
+          <p:cNvPicPr>
+            <a:picLocks noChangeAspect="1"/>
+          </p:cNvPicPr>
+          <p:nvPr/>
+        </p:nvPicPr>
+        <p:blipFill>
+          <a:blip r:embed="rId11" cstate="print"/>
+          <a:stretch>
+            <a:fillRect/>
+          </a:stretch>
+        </p:blipFill>
+        <p:spPr>
+          <a:xfrm>
+            <a:off x="12105452" y="6138365"/>
+            <a:ext cx="3674466" cy="1570790"/>
+          </a:xfrm>
+          <a:prstGeom prst="rect">
+            <a:avLst/>
+          </a:prstGeom>
+        </p:spPr>
+      </p:pic>
+    </p:spTree>
+  </p:cSld>
+  <p:clrMapOvr>
+    <a:masterClrMapping/>
+  </p:clrMapOvr>
+</p:sld>
+</file>
+
+<file path=ppt/slides/slide12.xml><?xml version="1.0" encoding="utf-8"?>
+<p:sld xmlns:a="http://schemas.openxmlformats.org/drawingml/2006/main" xmlns:r="http://schemas.openxmlformats.org/officeDocument/2006/relationships" xmlns:p="http://schemas.openxmlformats.org/presentationml/2006/main">
+  <p:cSld name="Slide 12">
+    <p:bg>
+      <p:bgPr>
+        <a:solidFill>
+          <a:srgbClr val="EEEEEE"/>
+        </a:solidFill>
+        <a:effectLst/>
+      </p:bgPr>
+    </p:bg>
+    <p:spTree>
+      <p:nvGrpSpPr>
+        <p:cNvPr id="1" name=""/>
+        <p:cNvGrpSpPr/>
+        <p:nvPr/>
+      </p:nvGrpSpPr>
+      <p:grpSpPr>
+        <a:xfrm>
+          <a:off x="0" y="0"/>
+          <a:ext cx="0" cy="0"/>
+          <a:chOff x="0" y="0"/>
+          <a:chExt cx="0" cy="0"/>
+        </a:xfrm>
+      </p:grpSpPr>
       <p:pic>
         <p:nvPicPr>
           <p:cNvPr id="2" name="Object 1"/>
@@ -3739,7 +4073,7 @@
         <p:spPr>
           <a:xfrm>
             <a:off x="17445144" y="9540858"/>
-            <a:ext cx="388673" cy="324435"/>
+            <a:ext cx="407721" cy="324435"/>
           </a:xfrm>
           <a:prstGeom prst="rect">
             <a:avLst/>
@@ -3790,7 +4124,7 @@
           <p:cNvPr id="4" name="TextBox 3">
             <a:extLst>
               <a:ext uri="{FF2B5EF4-FFF2-40B4-BE49-F238E27FC236}">
-                <a16:creationId xmlns:a16="http://schemas.microsoft.com/office/drawing/2014/main" id="{FE159D96-12D5-B4B4-F9AE-07577A49735A}"/>
+                <a16:creationId xmlns:a16="http://schemas.microsoft.com/office/drawing/2014/main" id="{83636371-D6D9-B128-3F79-683D58894DC2}"/>
               </a:ext>
             </a:extLst>
           </p:cNvPr>

</xml_diff>